<commit_message>
Update Gestion de projet - Diaporama.pptx
</commit_message>
<xml_diff>
--- a/Gestion de projet - Diaporama.pptx
+++ b/Gestion de projet - Diaporama.pptx
@@ -5,10 +5,10 @@
     <p:sldMasterId id="2147483684" r:id="rId1"/>
   </p:sldMasterIdLst>
   <p:notesMasterIdLst>
-    <p:notesMasterId r:id="rId13"/>
+    <p:notesMasterId r:id="rId14"/>
   </p:notesMasterIdLst>
   <p:handoutMasterIdLst>
-    <p:handoutMasterId r:id="rId14"/>
+    <p:handoutMasterId r:id="rId15"/>
   </p:handoutMasterIdLst>
   <p:sldIdLst>
     <p:sldId id="272" r:id="rId2"/>
@@ -17,11 +17,12 @@
     <p:sldId id="275" r:id="rId5"/>
     <p:sldId id="280" r:id="rId6"/>
     <p:sldId id="281" r:id="rId7"/>
-    <p:sldId id="282" r:id="rId8"/>
-    <p:sldId id="276" r:id="rId9"/>
-    <p:sldId id="277" r:id="rId10"/>
-    <p:sldId id="278" r:id="rId11"/>
-    <p:sldId id="279" r:id="rId12"/>
+    <p:sldId id="283" r:id="rId8"/>
+    <p:sldId id="282" r:id="rId9"/>
+    <p:sldId id="276" r:id="rId10"/>
+    <p:sldId id="277" r:id="rId11"/>
+    <p:sldId id="278" r:id="rId12"/>
+    <p:sldId id="279" r:id="rId13"/>
   </p:sldIdLst>
   <p:sldSz cx="12192000" cy="6858000"/>
   <p:notesSz cx="6858000" cy="9144000"/>
@@ -213,7 +214,7 @@
           <a:p>
             <a:fld id="{E3B35B99-2BE6-4901-A900-2D427A85D9D5}" type="datetime1">
               <a:rPr lang="fr-FR" smtClean="0"/>
-              <a:t>25/01/2023</a:t>
+              <a:t>27/01/2023</a:t>
             </a:fld>
             <a:endParaRPr lang="fr-FR" dirty="0"/>
           </a:p>
@@ -380,7 +381,7 @@
             <a:fld id="{E2C597D5-E44B-4BCF-8896-530F5382E068}" type="datetime1">
               <a:rPr lang="fr-FR" smtClean="0"/>
               <a:pPr/>
-              <a:t>25/01/2023</a:t>
+              <a:t>27/01/2023</a:t>
             </a:fld>
             <a:endParaRPr lang="fr-FR" dirty="0"/>
           </a:p>
@@ -811,7 +812,7 @@
     </p:spTree>
     <p:extLst>
       <p:ext uri="{BB962C8B-B14F-4D97-AF65-F5344CB8AC3E}">
-        <p14:creationId xmlns:p14="http://schemas.microsoft.com/office/powerpoint/2010/main" val="1586402425"/>
+        <p14:creationId xmlns:p14="http://schemas.microsoft.com/office/powerpoint/2010/main" val="1978021343"/>
       </p:ext>
     </p:extLst>
   </p:cSld>
@@ -888,6 +889,91 @@
             <a:fld id="{893B0CF2-7F87-4E02-A248-870047730F99}" type="slidenum">
               <a:rPr lang="fr-FR" smtClean="0"/>
               <a:t>11</a:t>
+            </a:fld>
+            <a:endParaRPr lang="fr-FR" dirty="0"/>
+          </a:p>
+        </p:txBody>
+      </p:sp>
+    </p:spTree>
+    <p:extLst>
+      <p:ext uri="{BB962C8B-B14F-4D97-AF65-F5344CB8AC3E}">
+        <p14:creationId xmlns:p14="http://schemas.microsoft.com/office/powerpoint/2010/main" val="1586402425"/>
+      </p:ext>
+    </p:extLst>
+  </p:cSld>
+  <p:clrMapOvr>
+    <a:masterClrMapping/>
+  </p:clrMapOvr>
+</p:notes>
+</file>
+
+<file path=ppt/notesSlides/notesSlide12.xml><?xml version="1.0" encoding="utf-8"?>
+<p:notes xmlns:a="http://schemas.openxmlformats.org/drawingml/2006/main" xmlns:r="http://schemas.openxmlformats.org/officeDocument/2006/relationships" xmlns:p="http://schemas.openxmlformats.org/presentationml/2006/main">
+  <p:cSld>
+    <p:spTree>
+      <p:nvGrpSpPr>
+        <p:cNvPr id="1" name=""/>
+        <p:cNvGrpSpPr/>
+        <p:nvPr/>
+      </p:nvGrpSpPr>
+      <p:grpSpPr>
+        <a:xfrm>
+          <a:off x="0" y="0"/>
+          <a:ext cx="0" cy="0"/>
+          <a:chOff x="0" y="0"/>
+          <a:chExt cx="0" cy="0"/>
+        </a:xfrm>
+      </p:grpSpPr>
+      <p:sp>
+        <p:nvSpPr>
+          <p:cNvPr id="2" name="Espace réservé de l'image des diapositives 1"/>
+          <p:cNvSpPr>
+            <a:spLocks noGrp="1" noRot="1" noChangeAspect="1"/>
+          </p:cNvSpPr>
+          <p:nvPr>
+            <p:ph type="sldImg"/>
+          </p:nvPr>
+        </p:nvSpPr>
+        <p:spPr/>
+      </p:sp>
+      <p:sp>
+        <p:nvSpPr>
+          <p:cNvPr id="3" name="Espace réservé des notes 2"/>
+          <p:cNvSpPr>
+            <a:spLocks noGrp="1"/>
+          </p:cNvSpPr>
+          <p:nvPr>
+            <p:ph type="body" idx="1"/>
+          </p:nvPr>
+        </p:nvSpPr>
+        <p:spPr/>
+        <p:txBody>
+          <a:bodyPr/>
+          <a:lstStyle/>
+          <a:p>
+            <a:endParaRPr lang="fr-FR" dirty="0"/>
+          </a:p>
+        </p:txBody>
+      </p:sp>
+      <p:sp>
+        <p:nvSpPr>
+          <p:cNvPr id="4" name="Espace réservé du numéro de diapositive 3"/>
+          <p:cNvSpPr>
+            <a:spLocks noGrp="1"/>
+          </p:cNvSpPr>
+          <p:nvPr>
+            <p:ph type="sldNum" sz="quarter" idx="10"/>
+          </p:nvPr>
+        </p:nvSpPr>
+        <p:spPr/>
+        <p:txBody>
+          <a:bodyPr/>
+          <a:lstStyle/>
+          <a:p>
+            <a:pPr rtl="0"/>
+            <a:fld id="{893B0CF2-7F87-4E02-A248-870047730F99}" type="slidenum">
+              <a:rPr lang="fr-FR" smtClean="0"/>
+              <a:t>12</a:t>
             </a:fld>
             <a:endParaRPr lang="fr-FR" dirty="0"/>
           </a:p>
@@ -1406,7 +1492,7 @@
     </p:spTree>
     <p:extLst>
       <p:ext uri="{BB962C8B-B14F-4D97-AF65-F5344CB8AC3E}">
-        <p14:creationId xmlns:p14="http://schemas.microsoft.com/office/powerpoint/2010/main" val="3005468062"/>
+        <p14:creationId xmlns:p14="http://schemas.microsoft.com/office/powerpoint/2010/main" val="1756107624"/>
       </p:ext>
     </p:extLst>
   </p:cSld>
@@ -1491,7 +1577,7 @@
     </p:spTree>
     <p:extLst>
       <p:ext uri="{BB962C8B-B14F-4D97-AF65-F5344CB8AC3E}">
-        <p14:creationId xmlns:p14="http://schemas.microsoft.com/office/powerpoint/2010/main" val="1878509797"/>
+        <p14:creationId xmlns:p14="http://schemas.microsoft.com/office/powerpoint/2010/main" val="3005468062"/>
       </p:ext>
     </p:extLst>
   </p:cSld>
@@ -1576,7 +1662,7 @@
     </p:spTree>
     <p:extLst>
       <p:ext uri="{BB962C8B-B14F-4D97-AF65-F5344CB8AC3E}">
-        <p14:creationId xmlns:p14="http://schemas.microsoft.com/office/powerpoint/2010/main" val="1978021343"/>
+        <p14:creationId xmlns:p14="http://schemas.microsoft.com/office/powerpoint/2010/main" val="1878509797"/>
       </p:ext>
     </p:extLst>
   </p:cSld>
@@ -1904,7 +1990,7 @@
             <a:pPr rtl="0"/>
             <a:fld id="{FBC17325-7F6F-46F3-B274-634CDE795A6B}" type="datetime1">
               <a:rPr lang="fr-FR" noProof="0" smtClean="0"/>
-              <a:t>25/01/2023</a:t>
+              <a:t>27/01/2023</a:t>
             </a:fld>
             <a:endParaRPr lang="fr-FR" noProof="0" dirty="0"/>
           </a:p>
@@ -2093,7 +2179,7 @@
             <a:pPr rtl="0"/>
             <a:fld id="{F682ADA2-97B9-4B65-8982-D7F7DD6DEE30}" type="datetime1">
               <a:rPr lang="fr-FR" noProof="0" smtClean="0"/>
-              <a:t>25/01/2023</a:t>
+              <a:t>27/01/2023</a:t>
             </a:fld>
             <a:endParaRPr lang="fr-FR" noProof="0" dirty="0"/>
           </a:p>
@@ -2292,7 +2378,7 @@
             <a:pPr rtl="0"/>
             <a:fld id="{592840CF-93F7-418F-9B5E-718D1718CC0D}" type="datetime1">
               <a:rPr lang="fr-FR" noProof="0" smtClean="0"/>
-              <a:t>25/01/2023</a:t>
+              <a:t>27/01/2023</a:t>
             </a:fld>
             <a:endParaRPr lang="fr-FR" noProof="0" dirty="0"/>
           </a:p>
@@ -2481,7 +2567,7 @@
             <a:pPr rtl="0"/>
             <a:fld id="{A82DABED-52C3-4F31-8CA6-CEAA3409EBE4}" type="datetime1">
               <a:rPr lang="fr-FR" noProof="0" smtClean="0"/>
-              <a:t>25/01/2023</a:t>
+              <a:t>27/01/2023</a:t>
             </a:fld>
             <a:endParaRPr lang="fr-FR" noProof="0" dirty="0"/>
           </a:p>
@@ -2733,7 +2819,7 @@
             <a:pPr rtl="0"/>
             <a:fld id="{8A3E9D3E-5B84-407F-9ABE-F8DB922CD54D}" type="datetime1">
               <a:rPr lang="fr-FR" noProof="0" smtClean="0"/>
-              <a:t>25/01/2023</a:t>
+              <a:t>27/01/2023</a:t>
             </a:fld>
             <a:endParaRPr lang="fr-FR" noProof="0" dirty="0"/>
           </a:p>
@@ -3021,7 +3107,7 @@
             <a:pPr rtl="0"/>
             <a:fld id="{A9A13BF1-AEEF-4263-A36C-8DBF0A9B6433}" type="datetime1">
               <a:rPr lang="fr-FR" noProof="0" smtClean="0"/>
-              <a:t>25/01/2023</a:t>
+              <a:t>27/01/2023</a:t>
             </a:fld>
             <a:endParaRPr lang="fr-FR" noProof="0" dirty="0"/>
           </a:p>
@@ -3423,7 +3509,7 @@
             <a:pPr rtl="0"/>
             <a:fld id="{2739279C-02D0-4CB2-BCE5-6195A30A8CFA}" type="datetime1">
               <a:rPr lang="fr-FR" noProof="0" smtClean="0"/>
-              <a:t>25/01/2023</a:t>
+              <a:t>27/01/2023</a:t>
             </a:fld>
             <a:endParaRPr lang="fr-FR" noProof="0" dirty="0"/>
           </a:p>
@@ -3597,7 +3683,7 @@
             <a:pPr rtl="0"/>
             <a:fld id="{2000754C-D49B-456E-9A10-7F56CCE3D488}" type="datetime1">
               <a:rPr lang="fr-FR" noProof="0" smtClean="0"/>
-              <a:t>25/01/2023</a:t>
+              <a:t>27/01/2023</a:t>
             </a:fld>
             <a:endParaRPr lang="fr-FR" noProof="0" dirty="0"/>
           </a:p>
@@ -3710,7 +3796,7 @@
             <a:pPr rtl="0"/>
             <a:fld id="{3BFF7478-2DF3-4DE0-B522-7178A9A2C7E0}" type="datetime1">
               <a:rPr lang="fr-FR" noProof="0" smtClean="0"/>
-              <a:t>25/01/2023</a:t>
+              <a:t>27/01/2023</a:t>
             </a:fld>
             <a:endParaRPr lang="fr-FR" noProof="0" dirty="0"/>
           </a:p>
@@ -3995,7 +4081,7 @@
             <a:pPr rtl="0"/>
             <a:fld id="{F9098FFF-E11D-4E0A-B923-5869D3FFAE58}" type="datetime1">
               <a:rPr lang="fr-FR" noProof="0" smtClean="0"/>
-              <a:t>25/01/2023</a:t>
+              <a:t>27/01/2023</a:t>
             </a:fld>
             <a:endParaRPr lang="fr-FR" noProof="0" dirty="0"/>
           </a:p>
@@ -4354,7 +4440,7 @@
             <a:pPr rtl="0"/>
             <a:fld id="{F8704CB1-556E-45D1-BEAF-1F724198DB9D}" type="datetime1">
               <a:rPr lang="fr-FR" noProof="0" smtClean="0"/>
-              <a:t>25/01/2023</a:t>
+              <a:t>27/01/2023</a:t>
             </a:fld>
             <a:endParaRPr lang="fr-FR" noProof="0" dirty="0"/>
           </a:p>
@@ -5392,7 +5478,7 @@
             <a:pPr rtl="0"/>
             <a:fld id="{A1F0232E-DA62-4F98-A375-D0E7F0C496FE}" type="datetime1">
               <a:rPr lang="fr-FR" noProof="0" smtClean="0"/>
-              <a:t>25/01/2023</a:t>
+              <a:t>27/01/2023</a:t>
             </a:fld>
             <a:endParaRPr lang="fr-FR" noProof="0" dirty="0"/>
           </a:p>
@@ -6002,6 +6088,93 @@
             <a:pPr rtl="0"/>
             <a:r>
               <a:rPr lang="fr-FR" dirty="0"/>
+              <a:t>État d’avancement du projet</a:t>
+            </a:r>
+          </a:p>
+        </p:txBody>
+      </p:sp>
+      <p:sp>
+        <p:nvSpPr>
+          <p:cNvPr id="2" name="Espace réservé du contenu 1"/>
+          <p:cNvSpPr>
+            <a:spLocks noGrp="1"/>
+          </p:cNvSpPr>
+          <p:nvPr>
+            <p:ph idx="1"/>
+          </p:nvPr>
+        </p:nvSpPr>
+        <p:spPr/>
+        <p:txBody>
+          <a:bodyPr rtlCol="0"/>
+          <a:lstStyle/>
+          <a:p>
+            <a:pPr marL="0" indent="0" rtl="0">
+              <a:buNone/>
+            </a:pPr>
+            <a:endParaRPr lang="fr-FR" dirty="0"/>
+          </a:p>
+        </p:txBody>
+      </p:sp>
+    </p:spTree>
+    <p:extLst>
+      <p:ext uri="{BB962C8B-B14F-4D97-AF65-F5344CB8AC3E}">
+        <p14:creationId xmlns:p14="http://schemas.microsoft.com/office/powerpoint/2010/main" val="1419453836"/>
+      </p:ext>
+    </p:extLst>
+  </p:cSld>
+  <p:clrMapOvr>
+    <a:masterClrMapping/>
+  </p:clrMapOvr>
+  <mc:AlternateContent xmlns:mc="http://schemas.openxmlformats.org/markup-compatibility/2006" xmlns:p14="http://schemas.microsoft.com/office/powerpoint/2010/main">
+    <mc:Choice Requires="p14">
+      <p:transition spd="med" p14:dur="700">
+        <p:fade/>
+      </p:transition>
+    </mc:Choice>
+    <mc:Fallback xmlns="">
+      <p:transition spd="med">
+        <p:fade/>
+      </p:transition>
+    </mc:Fallback>
+  </mc:AlternateContent>
+</p:sld>
+</file>
+
+<file path=ppt/slides/slide11.xml><?xml version="1.0" encoding="utf-8"?>
+<p:sld xmlns:a="http://schemas.openxmlformats.org/drawingml/2006/main" xmlns:r="http://schemas.openxmlformats.org/officeDocument/2006/relationships" xmlns:p="http://schemas.openxmlformats.org/presentationml/2006/main">
+  <p:cSld>
+    <p:spTree>
+      <p:nvGrpSpPr>
+        <p:cNvPr id="1" name=""/>
+        <p:cNvGrpSpPr/>
+        <p:nvPr/>
+      </p:nvGrpSpPr>
+      <p:grpSpPr>
+        <a:xfrm>
+          <a:off x="0" y="0"/>
+          <a:ext cx="0" cy="0"/>
+          <a:chOff x="0" y="0"/>
+          <a:chExt cx="0" cy="0"/>
+        </a:xfrm>
+      </p:grpSpPr>
+      <p:sp>
+        <p:nvSpPr>
+          <p:cNvPr id="3" name="Titre 2"/>
+          <p:cNvSpPr>
+            <a:spLocks noGrp="1"/>
+          </p:cNvSpPr>
+          <p:nvPr>
+            <p:ph type="title"/>
+          </p:nvPr>
+        </p:nvSpPr>
+        <p:spPr/>
+        <p:txBody>
+          <a:bodyPr rtlCol="0"/>
+          <a:lstStyle/>
+          <a:p>
+            <a:pPr rtl="0"/>
+            <a:r>
+              <a:rPr lang="fr-FR" dirty="0"/>
               <a:t>Pour aller plus loin</a:t>
             </a:r>
           </a:p>
@@ -6054,7 +6227,7 @@
 </p:sld>
 </file>
 
-<file path=ppt/slides/slide11.xml><?xml version="1.0" encoding="utf-8"?>
+<file path=ppt/slides/slide12.xml><?xml version="1.0" encoding="utf-8"?>
 <p:sld xmlns:a="http://schemas.openxmlformats.org/drawingml/2006/main" xmlns:r="http://schemas.openxmlformats.org/officeDocument/2006/relationships" xmlns:p="http://schemas.openxmlformats.org/presentationml/2006/main">
   <p:cSld>
     <p:spTree>
@@ -6151,9 +6324,16 @@
             <p:ph type="title"/>
           </p:nvPr>
         </p:nvSpPr>
-        <p:spPr/>
-        <p:txBody>
-          <a:bodyPr rtlCol="0"/>
+        <p:spPr>
+          <a:xfrm>
+            <a:off x="609600" y="704088"/>
+            <a:ext cx="10972800" cy="1143000"/>
+          </a:xfrm>
+        </p:spPr>
+        <p:txBody>
+          <a:bodyPr rtlCol="0" anchor="b">
+            <a:normAutofit/>
+          </a:bodyPr>
           <a:lstStyle/>
           <a:p>
             <a:pPr rtl="0"/>
@@ -6171,85 +6351,193 @@
             <a:spLocks noGrp="1"/>
           </p:cNvSpPr>
           <p:nvPr>
-            <p:ph idx="1"/>
+            <p:ph sz="half" idx="1"/>
           </p:nvPr>
         </p:nvSpPr>
         <p:spPr>
           <a:xfrm>
-            <a:off x="609600" y="2001740"/>
-            <a:ext cx="10972800" cy="4389120"/>
+            <a:off x="609600" y="2067340"/>
+            <a:ext cx="5490816" cy="4790660"/>
           </a:xfrm>
         </p:spPr>
         <p:txBody>
           <a:bodyPr rtlCol="0">
-            <a:normAutofit/>
+            <a:normAutofit lnSpcReduction="10000"/>
           </a:bodyPr>
           <a:lstStyle/>
           <a:p>
-            <a:pPr rtl="0"/>
-            <a:r>
-              <a:rPr lang="fr-FR" dirty="0"/>
+            <a:pPr rtl="0">
+              <a:lnSpc>
+                <a:spcPct val="90000"/>
+              </a:lnSpc>
+            </a:pPr>
+            <a:r>
+              <a:rPr lang="fr-FR" sz="2400" dirty="0"/>
               <a:t>Introduction de notre sujet, problématique et organisation</a:t>
             </a:r>
           </a:p>
           <a:p>
-            <a:pPr rtl="0"/>
-            <a:r>
-              <a:rPr lang="fr-FR" dirty="0"/>
+            <a:pPr rtl="0">
+              <a:lnSpc>
+                <a:spcPct val="50000"/>
+              </a:lnSpc>
+            </a:pPr>
+            <a:endParaRPr lang="fr-FR" sz="2400" dirty="0"/>
+          </a:p>
+          <a:p>
+            <a:pPr rtl="0">
+              <a:lnSpc>
+                <a:spcPct val="90000"/>
+              </a:lnSpc>
+            </a:pPr>
+            <a:r>
+              <a:rPr lang="fr-FR" sz="2400" dirty="0"/>
               <a:t>Résultats de recherche :</a:t>
             </a:r>
           </a:p>
           <a:p>
-            <a:pPr lvl="1"/>
+            <a:pPr lvl="1">
+              <a:lnSpc>
+                <a:spcPct val="90000"/>
+              </a:lnSpc>
+            </a:pPr>
             <a:r>
               <a:rPr lang="fr-FR" dirty="0"/>
               <a:t>Régions d’installation</a:t>
             </a:r>
           </a:p>
           <a:p>
-            <a:pPr lvl="1"/>
+            <a:pPr lvl="1">
+              <a:lnSpc>
+                <a:spcPct val="90000"/>
+              </a:lnSpc>
+            </a:pPr>
             <a:r>
               <a:rPr lang="fr-FR" dirty="0"/>
               <a:t>Groupes électrogènes</a:t>
             </a:r>
           </a:p>
           <a:p>
-            <a:pPr lvl="1"/>
+            <a:pPr lvl="1">
+              <a:lnSpc>
+                <a:spcPct val="90000"/>
+              </a:lnSpc>
+            </a:pPr>
             <a:r>
               <a:rPr lang="fr-FR" dirty="0"/>
               <a:t>Panneaux solaires</a:t>
             </a:r>
           </a:p>
           <a:p>
-            <a:pPr lvl="1"/>
+            <a:pPr lvl="1">
+              <a:lnSpc>
+                <a:spcPct val="90000"/>
+              </a:lnSpc>
+            </a:pPr>
             <a:r>
               <a:rPr lang="fr-FR" dirty="0"/>
               <a:t>Éoliennes</a:t>
             </a:r>
           </a:p>
           <a:p>
-            <a:pPr rtl="0"/>
-            <a:r>
-              <a:rPr lang="fr-FR" dirty="0"/>
+            <a:pPr lvl="1">
+              <a:lnSpc>
+                <a:spcPct val="60000"/>
+              </a:lnSpc>
+            </a:pPr>
+            <a:endParaRPr lang="fr-FR" dirty="0"/>
+          </a:p>
+          <a:p>
+            <a:pPr rtl="0">
+              <a:lnSpc>
+                <a:spcPct val="90000"/>
+              </a:lnSpc>
+            </a:pPr>
+            <a:r>
+              <a:rPr lang="fr-FR" sz="2400" dirty="0"/>
               <a:t>Notre solution</a:t>
             </a:r>
           </a:p>
           <a:p>
-            <a:pPr rtl="0"/>
-            <a:r>
-              <a:rPr lang="fr-FR" dirty="0"/>
+            <a:pPr rtl="0">
+              <a:lnSpc>
+                <a:spcPct val="60000"/>
+              </a:lnSpc>
+            </a:pPr>
+            <a:endParaRPr lang="fr-FR" sz="2400" dirty="0"/>
+          </a:p>
+          <a:p>
+            <a:pPr rtl="0">
+              <a:lnSpc>
+                <a:spcPct val="90000"/>
+              </a:lnSpc>
+            </a:pPr>
+            <a:r>
+              <a:rPr lang="fr-FR" sz="2400" dirty="0"/>
               <a:t>État d’avancement du projet</a:t>
             </a:r>
           </a:p>
           <a:p>
-            <a:pPr rtl="0"/>
-            <a:r>
-              <a:rPr lang="fr-FR" dirty="0"/>
+            <a:pPr rtl="0">
+              <a:lnSpc>
+                <a:spcPct val="60000"/>
+              </a:lnSpc>
+            </a:pPr>
+            <a:endParaRPr lang="fr-FR" sz="2400" dirty="0"/>
+          </a:p>
+          <a:p>
+            <a:pPr rtl="0">
+              <a:lnSpc>
+                <a:spcPct val="90000"/>
+              </a:lnSpc>
+            </a:pPr>
+            <a:r>
+              <a:rPr lang="fr-FR" sz="2400" dirty="0"/>
               <a:t>Pour aller plus loin</a:t>
             </a:r>
-          </a:p>
-        </p:txBody>
-      </p:sp>
+            <a:endParaRPr lang="fr-FR" dirty="0"/>
+          </a:p>
+        </p:txBody>
+      </p:sp>
+      <p:pic>
+        <p:nvPicPr>
+          <p:cNvPr id="5" name="Image 4" descr="Une image contenant crépuscule&#10;&#10;Description générée automatiquement">
+            <a:extLst>
+              <a:ext uri="{FF2B5EF4-FFF2-40B4-BE49-F238E27FC236}">
+                <a16:creationId xmlns:a16="http://schemas.microsoft.com/office/drawing/2014/main" id="{F85A7B9A-7A8A-C385-1247-8B3113D7C5D8}"/>
+              </a:ext>
+            </a:extLst>
+          </p:cNvPr>
+          <p:cNvPicPr>
+            <a:picLocks noChangeAspect="1"/>
+          </p:cNvPicPr>
+          <p:nvPr/>
+        </p:nvPicPr>
+        <p:blipFill rotWithShape="1">
+          <a:blip r:embed="rId3">
+            <a:extLst>
+              <a:ext uri="{28A0092B-C50C-407E-A947-70E740481C1C}">
+                <a14:useLocalDpi xmlns:a14="http://schemas.microsoft.com/office/drawing/2010/main" val="0"/>
+              </a:ext>
+            </a:extLst>
+          </a:blip>
+          <a:srcRect l="21000" r="18290" b="-1"/>
+          <a:stretch/>
+        </p:blipFill>
+        <p:spPr>
+          <a:xfrm>
+            <a:off x="6096000" y="2067340"/>
+            <a:ext cx="5384800" cy="4492486"/>
+          </a:xfrm>
+          <a:prstGeom prst="rect">
+            <a:avLst/>
+          </a:prstGeom>
+          <a:noFill/>
+          <a:effectLst>
+            <a:softEdge rad="228600"/>
+          </a:effectLst>
+        </p:spPr>
+      </p:pic>
     </p:spTree>
     <p:extLst>
       <p:ext uri="{BB962C8B-B14F-4D97-AF65-F5344CB8AC3E}">
@@ -6325,18 +6613,614 @@
             <p:ph idx="1"/>
           </p:nvPr>
         </p:nvSpPr>
-        <p:spPr/>
-        <p:txBody>
-          <a:bodyPr rtlCol="0"/>
-          <a:lstStyle/>
-          <a:p>
-            <a:pPr marL="0" indent="0" rtl="0">
+        <p:spPr>
+          <a:xfrm>
+            <a:off x="609600" y="1847687"/>
+            <a:ext cx="10972800" cy="4884417"/>
+          </a:xfrm>
+        </p:spPr>
+        <p:txBody>
+          <a:bodyPr rtlCol="0">
+            <a:normAutofit fontScale="92500" lnSpcReduction="10000"/>
+          </a:bodyPr>
+          <a:lstStyle/>
+          <a:p>
+            <a:endParaRPr lang="fr-FR" dirty="0"/>
+          </a:p>
+          <a:p>
+            <a:r>
+              <a:rPr lang="fr-FR" dirty="0"/>
+              <a:t>Sujet principal : l’agriculture</a:t>
+            </a:r>
+          </a:p>
+          <a:p>
+            <a:endParaRPr lang="fr-FR" dirty="0"/>
+          </a:p>
+          <a:p>
+            <a:r>
+              <a:rPr lang="fr-FR" dirty="0"/>
+              <a:t>Notre premier thème de recherche</a:t>
+            </a:r>
+          </a:p>
+          <a:p>
+            <a:endParaRPr lang="fr-FR" dirty="0"/>
+          </a:p>
+          <a:p>
+            <a:r>
+              <a:rPr lang="fr-FR" dirty="0"/>
+              <a:t>Changement de thème &amp; nouvelle</a:t>
+            </a:r>
+          </a:p>
+          <a:p>
+            <a:pPr marL="0" indent="0">
               <a:buNone/>
             </a:pPr>
+            <a:r>
+              <a:rPr lang="fr-FR" dirty="0"/>
+              <a:t>problématique</a:t>
+            </a:r>
+          </a:p>
+          <a:p>
             <a:endParaRPr lang="fr-FR" dirty="0"/>
           </a:p>
-        </p:txBody>
-      </p:sp>
+          <a:p>
+            <a:r>
+              <a:rPr lang="fr-FR" dirty="0"/>
+              <a:t>Organisation de notre groupe</a:t>
+            </a:r>
+          </a:p>
+          <a:p>
+            <a:endParaRPr lang="fr-FR" dirty="0"/>
+          </a:p>
+          <a:p>
+            <a:pPr marL="0" indent="0" algn="ctr">
+              <a:buNone/>
+            </a:pPr>
+            <a:r>
+              <a:rPr lang="fr-FR" sz="2800" b="1" i="1" u="sng" dirty="0">
+                <a:solidFill>
+                  <a:schemeClr val="tx1">
+                    <a:lumMod val="95000"/>
+                    <a:lumOff val="5000"/>
+                  </a:schemeClr>
+                </a:solidFill>
+                <a:effectLst/>
+              </a:rPr>
+              <a:t>Comment choisir la source d'énergie pour alimenter un système de pompage selon les caractéristiques de la région d’implantation ?</a:t>
+            </a:r>
+            <a:endParaRPr lang="fr-FR" sz="2800" b="1" i="0" u="sng" dirty="0">
+              <a:solidFill>
+                <a:schemeClr val="tx1">
+                  <a:lumMod val="95000"/>
+                  <a:lumOff val="5000"/>
+                </a:schemeClr>
+              </a:solidFill>
+              <a:effectLst/>
+            </a:endParaRPr>
+          </a:p>
+        </p:txBody>
+      </p:sp>
+      <p:pic>
+        <p:nvPicPr>
+          <p:cNvPr id="5" name="Image 4" descr="Une image contenant bulle&#10;&#10;Description générée automatiquement">
+            <a:extLst>
+              <a:ext uri="{FF2B5EF4-FFF2-40B4-BE49-F238E27FC236}">
+                <a16:creationId xmlns:a16="http://schemas.microsoft.com/office/drawing/2014/main" id="{DA64711E-8F25-AEEB-8672-14DFBF08F2A0}"/>
+              </a:ext>
+            </a:extLst>
+          </p:cNvPr>
+          <p:cNvPicPr>
+            <a:picLocks noChangeAspect="1"/>
+          </p:cNvPicPr>
+          <p:nvPr/>
+        </p:nvPicPr>
+        <p:blipFill>
+          <a:blip r:embed="rId3">
+            <a:extLst>
+              <a:ext uri="{28A0092B-C50C-407E-A947-70E740481C1C}">
+                <a14:useLocalDpi xmlns:a14="http://schemas.microsoft.com/office/drawing/2010/main" val="0"/>
+              </a:ext>
+            </a:extLst>
+          </a:blip>
+          <a:stretch>
+            <a:fillRect/>
+          </a:stretch>
+        </p:blipFill>
+        <p:spPr>
+          <a:xfrm>
+            <a:off x="5944847" y="1741672"/>
+            <a:ext cx="5602489" cy="3999433"/>
+          </a:xfrm>
+          <a:custGeom>
+            <a:avLst/>
+            <a:gdLst>
+              <a:gd name="connsiteX0" fmla="*/ 0 w 5602489"/>
+              <a:gd name="connsiteY0" fmla="*/ 0 h 3999433"/>
+              <a:gd name="connsiteX1" fmla="*/ 510449 w 5602489"/>
+              <a:gd name="connsiteY1" fmla="*/ 0 h 3999433"/>
+              <a:gd name="connsiteX2" fmla="*/ 1244998 w 5602489"/>
+              <a:gd name="connsiteY2" fmla="*/ 0 h 3999433"/>
+              <a:gd name="connsiteX3" fmla="*/ 1979546 w 5602489"/>
+              <a:gd name="connsiteY3" fmla="*/ 0 h 3999433"/>
+              <a:gd name="connsiteX4" fmla="*/ 2714095 w 5602489"/>
+              <a:gd name="connsiteY4" fmla="*/ 0 h 3999433"/>
+              <a:gd name="connsiteX5" fmla="*/ 3392618 w 5602489"/>
+              <a:gd name="connsiteY5" fmla="*/ 0 h 3999433"/>
+              <a:gd name="connsiteX6" fmla="*/ 4071142 w 5602489"/>
+              <a:gd name="connsiteY6" fmla="*/ 0 h 3999433"/>
+              <a:gd name="connsiteX7" fmla="*/ 4637616 w 5602489"/>
+              <a:gd name="connsiteY7" fmla="*/ 0 h 3999433"/>
+              <a:gd name="connsiteX8" fmla="*/ 5602489 w 5602489"/>
+              <a:gd name="connsiteY8" fmla="*/ 0 h 3999433"/>
+              <a:gd name="connsiteX9" fmla="*/ 5602489 w 5602489"/>
+              <a:gd name="connsiteY9" fmla="*/ 746561 h 3999433"/>
+              <a:gd name="connsiteX10" fmla="*/ 5602489 w 5602489"/>
+              <a:gd name="connsiteY10" fmla="*/ 1293150 h 3999433"/>
+              <a:gd name="connsiteX11" fmla="*/ 5602489 w 5602489"/>
+              <a:gd name="connsiteY11" fmla="*/ 2039711 h 3999433"/>
+              <a:gd name="connsiteX12" fmla="*/ 5602489 w 5602489"/>
+              <a:gd name="connsiteY12" fmla="*/ 2786272 h 3999433"/>
+              <a:gd name="connsiteX13" fmla="*/ 5602489 w 5602489"/>
+              <a:gd name="connsiteY13" fmla="*/ 3999433 h 3999433"/>
+              <a:gd name="connsiteX14" fmla="*/ 5148065 w 5602489"/>
+              <a:gd name="connsiteY14" fmla="*/ 3999433 h 3999433"/>
+              <a:gd name="connsiteX15" fmla="*/ 4693641 w 5602489"/>
+              <a:gd name="connsiteY15" fmla="*/ 3999433 h 3999433"/>
+              <a:gd name="connsiteX16" fmla="*/ 4183192 w 5602489"/>
+              <a:gd name="connsiteY16" fmla="*/ 3999433 h 3999433"/>
+              <a:gd name="connsiteX17" fmla="*/ 3504668 w 5602489"/>
+              <a:gd name="connsiteY17" fmla="*/ 3999433 h 3999433"/>
+              <a:gd name="connsiteX18" fmla="*/ 2882169 w 5602489"/>
+              <a:gd name="connsiteY18" fmla="*/ 3999433 h 3999433"/>
+              <a:gd name="connsiteX19" fmla="*/ 2371720 w 5602489"/>
+              <a:gd name="connsiteY19" fmla="*/ 3999433 h 3999433"/>
+              <a:gd name="connsiteX20" fmla="*/ 1861271 w 5602489"/>
+              <a:gd name="connsiteY20" fmla="*/ 3999433 h 3999433"/>
+              <a:gd name="connsiteX21" fmla="*/ 1126723 w 5602489"/>
+              <a:gd name="connsiteY21" fmla="*/ 3999433 h 3999433"/>
+              <a:gd name="connsiteX22" fmla="*/ 616274 w 5602489"/>
+              <a:gd name="connsiteY22" fmla="*/ 3999433 h 3999433"/>
+              <a:gd name="connsiteX23" fmla="*/ 0 w 5602489"/>
+              <a:gd name="connsiteY23" fmla="*/ 3999433 h 3999433"/>
+              <a:gd name="connsiteX24" fmla="*/ 0 w 5602489"/>
+              <a:gd name="connsiteY24" fmla="*/ 3452844 h 3999433"/>
+              <a:gd name="connsiteX25" fmla="*/ 0 w 5602489"/>
+              <a:gd name="connsiteY25" fmla="*/ 2706283 h 3999433"/>
+              <a:gd name="connsiteX26" fmla="*/ 0 w 5602489"/>
+              <a:gd name="connsiteY26" fmla="*/ 1999717 h 3999433"/>
+              <a:gd name="connsiteX27" fmla="*/ 0 w 5602489"/>
+              <a:gd name="connsiteY27" fmla="*/ 1373139 h 3999433"/>
+              <a:gd name="connsiteX28" fmla="*/ 0 w 5602489"/>
+              <a:gd name="connsiteY28" fmla="*/ 706566 h 3999433"/>
+              <a:gd name="connsiteX29" fmla="*/ 0 w 5602489"/>
+              <a:gd name="connsiteY29" fmla="*/ 0 h 3999433"/>
+            </a:gdLst>
+            <a:ahLst/>
+            <a:cxnLst>
+              <a:cxn ang="0">
+                <a:pos x="connsiteX0" y="connsiteY0"/>
+              </a:cxn>
+              <a:cxn ang="0">
+                <a:pos x="connsiteX1" y="connsiteY1"/>
+              </a:cxn>
+              <a:cxn ang="0">
+                <a:pos x="connsiteX2" y="connsiteY2"/>
+              </a:cxn>
+              <a:cxn ang="0">
+                <a:pos x="connsiteX3" y="connsiteY3"/>
+              </a:cxn>
+              <a:cxn ang="0">
+                <a:pos x="connsiteX4" y="connsiteY4"/>
+              </a:cxn>
+              <a:cxn ang="0">
+                <a:pos x="connsiteX5" y="connsiteY5"/>
+              </a:cxn>
+              <a:cxn ang="0">
+                <a:pos x="connsiteX6" y="connsiteY6"/>
+              </a:cxn>
+              <a:cxn ang="0">
+                <a:pos x="connsiteX7" y="connsiteY7"/>
+              </a:cxn>
+              <a:cxn ang="0">
+                <a:pos x="connsiteX8" y="connsiteY8"/>
+              </a:cxn>
+              <a:cxn ang="0">
+                <a:pos x="connsiteX9" y="connsiteY9"/>
+              </a:cxn>
+              <a:cxn ang="0">
+                <a:pos x="connsiteX10" y="connsiteY10"/>
+              </a:cxn>
+              <a:cxn ang="0">
+                <a:pos x="connsiteX11" y="connsiteY11"/>
+              </a:cxn>
+              <a:cxn ang="0">
+                <a:pos x="connsiteX12" y="connsiteY12"/>
+              </a:cxn>
+              <a:cxn ang="0">
+                <a:pos x="connsiteX13" y="connsiteY13"/>
+              </a:cxn>
+              <a:cxn ang="0">
+                <a:pos x="connsiteX14" y="connsiteY14"/>
+              </a:cxn>
+              <a:cxn ang="0">
+                <a:pos x="connsiteX15" y="connsiteY15"/>
+              </a:cxn>
+              <a:cxn ang="0">
+                <a:pos x="connsiteX16" y="connsiteY16"/>
+              </a:cxn>
+              <a:cxn ang="0">
+                <a:pos x="connsiteX17" y="connsiteY17"/>
+              </a:cxn>
+              <a:cxn ang="0">
+                <a:pos x="connsiteX18" y="connsiteY18"/>
+              </a:cxn>
+              <a:cxn ang="0">
+                <a:pos x="connsiteX19" y="connsiteY19"/>
+              </a:cxn>
+              <a:cxn ang="0">
+                <a:pos x="connsiteX20" y="connsiteY20"/>
+              </a:cxn>
+              <a:cxn ang="0">
+                <a:pos x="connsiteX21" y="connsiteY21"/>
+              </a:cxn>
+              <a:cxn ang="0">
+                <a:pos x="connsiteX22" y="connsiteY22"/>
+              </a:cxn>
+              <a:cxn ang="0">
+                <a:pos x="connsiteX23" y="connsiteY23"/>
+              </a:cxn>
+              <a:cxn ang="0">
+                <a:pos x="connsiteX24" y="connsiteY24"/>
+              </a:cxn>
+              <a:cxn ang="0">
+                <a:pos x="connsiteX25" y="connsiteY25"/>
+              </a:cxn>
+              <a:cxn ang="0">
+                <a:pos x="connsiteX26" y="connsiteY26"/>
+              </a:cxn>
+              <a:cxn ang="0">
+                <a:pos x="connsiteX27" y="connsiteY27"/>
+              </a:cxn>
+              <a:cxn ang="0">
+                <a:pos x="connsiteX28" y="connsiteY28"/>
+              </a:cxn>
+              <a:cxn ang="0">
+                <a:pos x="connsiteX29" y="connsiteY29"/>
+              </a:cxn>
+            </a:cxnLst>
+            <a:rect l="l" t="t" r="r" b="b"/>
+            <a:pathLst>
+              <a:path w="5602489" h="3999433" fill="none" extrusionOk="0">
+                <a:moveTo>
+                  <a:pt x="0" y="0"/>
+                </a:moveTo>
+                <a:cubicBezTo>
+                  <a:pt x="225774" y="2308"/>
+                  <a:pt x="396273" y="20930"/>
+                  <a:pt x="510449" y="0"/>
+                </a:cubicBezTo>
+                <a:cubicBezTo>
+                  <a:pt x="624625" y="-20930"/>
+                  <a:pt x="1088807" y="19343"/>
+                  <a:pt x="1244998" y="0"/>
+                </a:cubicBezTo>
+                <a:cubicBezTo>
+                  <a:pt x="1401189" y="-19343"/>
+                  <a:pt x="1697894" y="28153"/>
+                  <a:pt x="1979546" y="0"/>
+                </a:cubicBezTo>
+                <a:cubicBezTo>
+                  <a:pt x="2261198" y="-28153"/>
+                  <a:pt x="2534610" y="28789"/>
+                  <a:pt x="2714095" y="0"/>
+                </a:cubicBezTo>
+                <a:cubicBezTo>
+                  <a:pt x="2893580" y="-28789"/>
+                  <a:pt x="3166835" y="29713"/>
+                  <a:pt x="3392618" y="0"/>
+                </a:cubicBezTo>
+                <a:cubicBezTo>
+                  <a:pt x="3618401" y="-29713"/>
+                  <a:pt x="3775938" y="15940"/>
+                  <a:pt x="4071142" y="0"/>
+                </a:cubicBezTo>
+                <a:cubicBezTo>
+                  <a:pt x="4366346" y="-15940"/>
+                  <a:pt x="4420015" y="-8618"/>
+                  <a:pt x="4637616" y="0"/>
+                </a:cubicBezTo>
+                <a:cubicBezTo>
+                  <a:pt x="4855217" y="8618"/>
+                  <a:pt x="5307938" y="-11925"/>
+                  <a:pt x="5602489" y="0"/>
+                </a:cubicBezTo>
+                <a:cubicBezTo>
+                  <a:pt x="5609704" y="328093"/>
+                  <a:pt x="5588910" y="510018"/>
+                  <a:pt x="5602489" y="746561"/>
+                </a:cubicBezTo>
+                <a:cubicBezTo>
+                  <a:pt x="5616068" y="983104"/>
+                  <a:pt x="5614658" y="1176632"/>
+                  <a:pt x="5602489" y="1293150"/>
+                </a:cubicBezTo>
+                <a:cubicBezTo>
+                  <a:pt x="5590320" y="1409668"/>
+                  <a:pt x="5584355" y="1860605"/>
+                  <a:pt x="5602489" y="2039711"/>
+                </a:cubicBezTo>
+                <a:cubicBezTo>
+                  <a:pt x="5620623" y="2218817"/>
+                  <a:pt x="5570500" y="2594946"/>
+                  <a:pt x="5602489" y="2786272"/>
+                </a:cubicBezTo>
+                <a:cubicBezTo>
+                  <a:pt x="5634478" y="2977598"/>
+                  <a:pt x="5608418" y="3478779"/>
+                  <a:pt x="5602489" y="3999433"/>
+                </a:cubicBezTo>
+                <a:cubicBezTo>
+                  <a:pt x="5423729" y="4009270"/>
+                  <a:pt x="5241758" y="3986993"/>
+                  <a:pt x="5148065" y="3999433"/>
+                </a:cubicBezTo>
+                <a:cubicBezTo>
+                  <a:pt x="5054372" y="4011873"/>
+                  <a:pt x="4875836" y="3980720"/>
+                  <a:pt x="4693641" y="3999433"/>
+                </a:cubicBezTo>
+                <a:cubicBezTo>
+                  <a:pt x="4511446" y="4018146"/>
+                  <a:pt x="4369286" y="3982744"/>
+                  <a:pt x="4183192" y="3999433"/>
+                </a:cubicBezTo>
+                <a:cubicBezTo>
+                  <a:pt x="3997098" y="4016122"/>
+                  <a:pt x="3704433" y="3978675"/>
+                  <a:pt x="3504668" y="3999433"/>
+                </a:cubicBezTo>
+                <a:cubicBezTo>
+                  <a:pt x="3304903" y="4020191"/>
+                  <a:pt x="3091614" y="4024609"/>
+                  <a:pt x="2882169" y="3999433"/>
+                </a:cubicBezTo>
+                <a:cubicBezTo>
+                  <a:pt x="2672724" y="3974257"/>
+                  <a:pt x="2475791" y="3995002"/>
+                  <a:pt x="2371720" y="3999433"/>
+                </a:cubicBezTo>
+                <a:cubicBezTo>
+                  <a:pt x="2267649" y="4003864"/>
+                  <a:pt x="2055492" y="4019121"/>
+                  <a:pt x="1861271" y="3999433"/>
+                </a:cubicBezTo>
+                <a:cubicBezTo>
+                  <a:pt x="1667050" y="3979745"/>
+                  <a:pt x="1392701" y="4003573"/>
+                  <a:pt x="1126723" y="3999433"/>
+                </a:cubicBezTo>
+                <a:cubicBezTo>
+                  <a:pt x="860745" y="3995293"/>
+                  <a:pt x="746802" y="3995398"/>
+                  <a:pt x="616274" y="3999433"/>
+                </a:cubicBezTo>
+                <a:cubicBezTo>
+                  <a:pt x="485746" y="4003468"/>
+                  <a:pt x="288212" y="3973645"/>
+                  <a:pt x="0" y="3999433"/>
+                </a:cubicBezTo>
+                <a:cubicBezTo>
+                  <a:pt x="-15405" y="3864548"/>
+                  <a:pt x="-7350" y="3585257"/>
+                  <a:pt x="0" y="3452844"/>
+                </a:cubicBezTo>
+                <a:cubicBezTo>
+                  <a:pt x="7350" y="3320431"/>
+                  <a:pt x="33385" y="3041697"/>
+                  <a:pt x="0" y="2706283"/>
+                </a:cubicBezTo>
+                <a:cubicBezTo>
+                  <a:pt x="-33385" y="2370869"/>
+                  <a:pt x="23465" y="2195508"/>
+                  <a:pt x="0" y="1999717"/>
+                </a:cubicBezTo>
+                <a:cubicBezTo>
+                  <a:pt x="-23465" y="1803926"/>
+                  <a:pt x="-8023" y="1536568"/>
+                  <a:pt x="0" y="1373139"/>
+                </a:cubicBezTo>
+                <a:cubicBezTo>
+                  <a:pt x="8023" y="1209710"/>
+                  <a:pt x="1458" y="1023646"/>
+                  <a:pt x="0" y="706566"/>
+                </a:cubicBezTo>
+                <a:cubicBezTo>
+                  <a:pt x="-1458" y="389486"/>
+                  <a:pt x="19707" y="178596"/>
+                  <a:pt x="0" y="0"/>
+                </a:cubicBezTo>
+                <a:close/>
+              </a:path>
+              <a:path w="5602489" h="3999433" stroke="0" extrusionOk="0">
+                <a:moveTo>
+                  <a:pt x="0" y="0"/>
+                </a:moveTo>
+                <a:cubicBezTo>
+                  <a:pt x="149195" y="202"/>
+                  <a:pt x="292586" y="5699"/>
+                  <a:pt x="454424" y="0"/>
+                </a:cubicBezTo>
+                <a:cubicBezTo>
+                  <a:pt x="616262" y="-5699"/>
+                  <a:pt x="800223" y="-33901"/>
+                  <a:pt x="1132948" y="0"/>
+                </a:cubicBezTo>
+                <a:cubicBezTo>
+                  <a:pt x="1465673" y="33901"/>
+                  <a:pt x="1421798" y="-112"/>
+                  <a:pt x="1587372" y="0"/>
+                </a:cubicBezTo>
+                <a:cubicBezTo>
+                  <a:pt x="1752946" y="112"/>
+                  <a:pt x="2151310" y="-35636"/>
+                  <a:pt x="2321920" y="0"/>
+                </a:cubicBezTo>
+                <a:cubicBezTo>
+                  <a:pt x="2492530" y="35636"/>
+                  <a:pt x="2573675" y="-648"/>
+                  <a:pt x="2776345" y="0"/>
+                </a:cubicBezTo>
+                <a:cubicBezTo>
+                  <a:pt x="2979016" y="648"/>
+                  <a:pt x="3219828" y="-15372"/>
+                  <a:pt x="3342818" y="0"/>
+                </a:cubicBezTo>
+                <a:cubicBezTo>
+                  <a:pt x="3465808" y="15372"/>
+                  <a:pt x="3651395" y="-3222"/>
+                  <a:pt x="3853267" y="0"/>
+                </a:cubicBezTo>
+                <a:cubicBezTo>
+                  <a:pt x="4055139" y="3222"/>
+                  <a:pt x="4323896" y="-23860"/>
+                  <a:pt x="4475766" y="0"/>
+                </a:cubicBezTo>
+                <a:cubicBezTo>
+                  <a:pt x="4627636" y="23860"/>
+                  <a:pt x="5209176" y="-37271"/>
+                  <a:pt x="5602489" y="0"/>
+                </a:cubicBezTo>
+                <a:cubicBezTo>
+                  <a:pt x="5609150" y="192320"/>
+                  <a:pt x="5592112" y="330905"/>
+                  <a:pt x="5602489" y="626578"/>
+                </a:cubicBezTo>
+                <a:cubicBezTo>
+                  <a:pt x="5612866" y="922251"/>
+                  <a:pt x="5617023" y="981520"/>
+                  <a:pt x="5602489" y="1253156"/>
+                </a:cubicBezTo>
+                <a:cubicBezTo>
+                  <a:pt x="5587955" y="1524792"/>
+                  <a:pt x="5617468" y="1636448"/>
+                  <a:pt x="5602489" y="1879734"/>
+                </a:cubicBezTo>
+                <a:cubicBezTo>
+                  <a:pt x="5587510" y="2123020"/>
+                  <a:pt x="5609015" y="2267579"/>
+                  <a:pt x="5602489" y="2546306"/>
+                </a:cubicBezTo>
+                <a:cubicBezTo>
+                  <a:pt x="5595963" y="2825033"/>
+                  <a:pt x="5612512" y="2943958"/>
+                  <a:pt x="5602489" y="3252872"/>
+                </a:cubicBezTo>
+                <a:cubicBezTo>
+                  <a:pt x="5592466" y="3561786"/>
+                  <a:pt x="5613497" y="3821671"/>
+                  <a:pt x="5602489" y="3999433"/>
+                </a:cubicBezTo>
+                <a:cubicBezTo>
+                  <a:pt x="5368871" y="3975254"/>
+                  <a:pt x="5325930" y="3991300"/>
+                  <a:pt x="5092040" y="3999433"/>
+                </a:cubicBezTo>
+                <a:cubicBezTo>
+                  <a:pt x="4858150" y="4007566"/>
+                  <a:pt x="4601329" y="4009102"/>
+                  <a:pt x="4469541" y="3999433"/>
+                </a:cubicBezTo>
+                <a:cubicBezTo>
+                  <a:pt x="4337753" y="3989764"/>
+                  <a:pt x="3928702" y="3975998"/>
+                  <a:pt x="3734993" y="3999433"/>
+                </a:cubicBezTo>
+                <a:cubicBezTo>
+                  <a:pt x="3541284" y="4022868"/>
+                  <a:pt x="3282443" y="4011801"/>
+                  <a:pt x="3168519" y="3999433"/>
+                </a:cubicBezTo>
+                <a:cubicBezTo>
+                  <a:pt x="3054595" y="3987065"/>
+                  <a:pt x="2829620" y="4012375"/>
+                  <a:pt x="2714095" y="3999433"/>
+                </a:cubicBezTo>
+                <a:cubicBezTo>
+                  <a:pt x="2598570" y="3986491"/>
+                  <a:pt x="2320323" y="4032993"/>
+                  <a:pt x="2035571" y="3999433"/>
+                </a:cubicBezTo>
+                <a:cubicBezTo>
+                  <a:pt x="1750819" y="3965873"/>
+                  <a:pt x="1605126" y="4017033"/>
+                  <a:pt x="1469097" y="3999433"/>
+                </a:cubicBezTo>
+                <a:cubicBezTo>
+                  <a:pt x="1333068" y="3981833"/>
+                  <a:pt x="1016550" y="3975948"/>
+                  <a:pt x="902623" y="3999433"/>
+                </a:cubicBezTo>
+                <a:cubicBezTo>
+                  <a:pt x="788696" y="4022918"/>
+                  <a:pt x="395414" y="3988914"/>
+                  <a:pt x="0" y="3999433"/>
+                </a:cubicBezTo>
+                <a:cubicBezTo>
+                  <a:pt x="-26006" y="3742629"/>
+                  <a:pt x="-10707" y="3689868"/>
+                  <a:pt x="0" y="3412849"/>
+                </a:cubicBezTo>
+                <a:cubicBezTo>
+                  <a:pt x="10707" y="3135830"/>
+                  <a:pt x="-17701" y="3026613"/>
+                  <a:pt x="0" y="2826266"/>
+                </a:cubicBezTo>
+                <a:cubicBezTo>
+                  <a:pt x="17701" y="2625919"/>
+                  <a:pt x="17384" y="2435728"/>
+                  <a:pt x="0" y="2239682"/>
+                </a:cubicBezTo>
+                <a:cubicBezTo>
+                  <a:pt x="-17384" y="2043636"/>
+                  <a:pt x="-6899" y="1846084"/>
+                  <a:pt x="0" y="1693093"/>
+                </a:cubicBezTo>
+                <a:cubicBezTo>
+                  <a:pt x="6899" y="1540102"/>
+                  <a:pt x="-26821" y="1366773"/>
+                  <a:pt x="0" y="1066515"/>
+                </a:cubicBezTo>
+                <a:cubicBezTo>
+                  <a:pt x="26821" y="766257"/>
+                  <a:pt x="19178" y="312345"/>
+                  <a:pt x="0" y="0"/>
+                </a:cubicBezTo>
+                <a:close/>
+              </a:path>
+            </a:pathLst>
+          </a:custGeom>
+          <a:ln w="38100">
+            <a:solidFill>
+              <a:schemeClr val="tx2"/>
+            </a:solidFill>
+            <a:extLst>
+              <a:ext uri="{C807C97D-BFC1-408E-A445-0C87EB9F89A2}">
+                <ask:lineSketchStyleProps xmlns:ask="http://schemas.microsoft.com/office/drawing/2018/sketchyshapes" sd="4181791145">
+                  <a:prstGeom prst="rect">
+                    <a:avLst/>
+                  </a:prstGeom>
+                  <ask:type>
+                    <ask:lineSketchFreehand/>
+                  </ask:type>
+                </ask:lineSketchStyleProps>
+              </a:ext>
+            </a:extLst>
+          </a:ln>
+          <a:effectLst>
+            <a:softEdge rad="228600"/>
+          </a:effectLst>
+        </p:spPr>
+      </p:pic>
     </p:spTree>
     <p:extLst>
       <p:ext uri="{BB962C8B-B14F-4D97-AF65-F5344CB8AC3E}">
@@ -6419,7 +7303,7 @@
           <a:p>
             <a:pPr rtl="0"/>
             <a:r>
-              <a:rPr lang="fr-FR" dirty="0"/>
+              <a:rPr lang="fr-FR" b="1" dirty="0"/>
               <a:t>Régions d’installation</a:t>
             </a:r>
           </a:p>
@@ -6507,7 +7391,7 @@
           <a:p>
             <a:pPr rtl="0"/>
             <a:r>
-              <a:rPr lang="fr-FR" dirty="0"/>
+              <a:rPr lang="fr-FR" b="1" dirty="0"/>
               <a:t>Groupes électrogènes</a:t>
             </a:r>
           </a:p>
@@ -6523,13 +7407,13 @@
   <p:clrMapOvr>
     <a:masterClrMapping/>
   </p:clrMapOvr>
-  <mc:AlternateContent xmlns:mc="http://schemas.openxmlformats.org/markup-compatibility/2006">
-    <mc:Choice xmlns:p14="http://schemas.microsoft.com/office/powerpoint/2010/main" Requires="p14">
+  <mc:AlternateContent xmlns:mc="http://schemas.openxmlformats.org/markup-compatibility/2006" xmlns:p14="http://schemas.microsoft.com/office/powerpoint/2010/main">
+    <mc:Choice Requires="p14">
       <p:transition spd="med" p14:dur="700">
         <p:fade/>
       </p:transition>
     </mc:Choice>
-    <mc:Fallback>
+    <mc:Fallback xmlns="">
       <p:transition spd="med">
         <p:fade/>
       </p:transition>
@@ -6565,9 +7449,16 @@
             <p:ph type="title"/>
           </p:nvPr>
         </p:nvSpPr>
-        <p:spPr/>
-        <p:txBody>
-          <a:bodyPr rtlCol="0"/>
+        <p:spPr>
+          <a:xfrm>
+            <a:off x="609600" y="704088"/>
+            <a:ext cx="10972800" cy="1143000"/>
+          </a:xfrm>
+        </p:spPr>
+        <p:txBody>
+          <a:bodyPr rtlCol="0" anchor="b">
+            <a:normAutofit/>
+          </a:bodyPr>
           <a:lstStyle/>
           <a:p>
             <a:pPr rtl="0"/>
@@ -6585,22 +7476,179 @@
             <a:spLocks noGrp="1"/>
           </p:cNvSpPr>
           <p:nvPr>
-            <p:ph idx="1"/>
-          </p:nvPr>
-        </p:nvSpPr>
-        <p:spPr/>
-        <p:txBody>
-          <a:bodyPr rtlCol="0"/>
-          <a:lstStyle/>
-          <a:p>
-            <a:pPr rtl="0"/>
-            <a:r>
-              <a:rPr lang="fr-FR" dirty="0"/>
+            <p:ph sz="half" idx="1"/>
+          </p:nvPr>
+        </p:nvSpPr>
+        <p:spPr>
+          <a:xfrm>
+            <a:off x="609600" y="2088901"/>
+            <a:ext cx="5384800" cy="4434840"/>
+          </a:xfrm>
+        </p:spPr>
+        <p:txBody>
+          <a:bodyPr rtlCol="0">
+            <a:normAutofit/>
+          </a:bodyPr>
+          <a:lstStyle/>
+          <a:p>
+            <a:pPr rtl="0">
+              <a:lnSpc>
+                <a:spcPct val="90000"/>
+              </a:lnSpc>
+            </a:pPr>
+            <a:r>
+              <a:rPr lang="fr-FR" b="1" dirty="0"/>
               <a:t>Panneaux solaires</a:t>
             </a:r>
           </a:p>
-        </p:txBody>
-      </p:sp>
+          <a:p>
+            <a:pPr rtl="0">
+              <a:lnSpc>
+                <a:spcPct val="90000"/>
+              </a:lnSpc>
+            </a:pPr>
+            <a:endParaRPr lang="fr-FR" dirty="0"/>
+          </a:p>
+          <a:p>
+            <a:pPr lvl="1" fontAlgn="base">
+              <a:lnSpc>
+                <a:spcPct val="90000"/>
+              </a:lnSpc>
+            </a:pPr>
+            <a:r>
+              <a:rPr lang="fr-FR" sz="2600" b="0" i="1" u="sng" dirty="0">
+                <a:effectLst/>
+              </a:rPr>
+              <a:t>Panneaux solaires photovoltaïques</a:t>
+            </a:r>
+          </a:p>
+          <a:p>
+            <a:pPr lvl="1" fontAlgn="base">
+              <a:lnSpc>
+                <a:spcPct val="90000"/>
+              </a:lnSpc>
+            </a:pPr>
+            <a:endParaRPr lang="fr-FR" sz="2600" b="0" i="1" dirty="0">
+              <a:effectLst/>
+            </a:endParaRPr>
+          </a:p>
+          <a:p>
+            <a:pPr lvl="1" fontAlgn="base">
+              <a:lnSpc>
+                <a:spcPct val="90000"/>
+              </a:lnSpc>
+            </a:pPr>
+            <a:r>
+              <a:rPr lang="fr-FR" sz="2600" b="0" i="1" dirty="0">
+                <a:effectLst/>
+              </a:rPr>
+              <a:t>Panneaux solaires thermiques</a:t>
+            </a:r>
+          </a:p>
+          <a:p>
+            <a:pPr lvl="1" fontAlgn="base">
+              <a:lnSpc>
+                <a:spcPct val="90000"/>
+              </a:lnSpc>
+            </a:pPr>
+            <a:endParaRPr lang="fr-FR" sz="2600" b="0" i="1" dirty="0">
+              <a:effectLst/>
+            </a:endParaRPr>
+          </a:p>
+          <a:p>
+            <a:pPr lvl="1" fontAlgn="base">
+              <a:lnSpc>
+                <a:spcPct val="90000"/>
+              </a:lnSpc>
+            </a:pPr>
+            <a:r>
+              <a:rPr lang="fr-FR" sz="2600" b="0" i="1" dirty="0">
+                <a:effectLst/>
+              </a:rPr>
+              <a:t>Panneaux solaires </a:t>
+            </a:r>
+            <a:r>
+              <a:rPr lang="fr-FR" sz="2600" b="0" i="1" dirty="0" err="1">
+                <a:effectLst/>
+              </a:rPr>
+              <a:t>aérovoltaïques</a:t>
+            </a:r>
+            <a:endParaRPr lang="fr-FR" sz="2600" b="0" i="1" dirty="0">
+              <a:effectLst/>
+            </a:endParaRPr>
+          </a:p>
+          <a:p>
+            <a:pPr lvl="1" fontAlgn="base">
+              <a:lnSpc>
+                <a:spcPct val="90000"/>
+              </a:lnSpc>
+            </a:pPr>
+            <a:endParaRPr lang="fr-FR" sz="2600" b="0" i="1" dirty="0">
+              <a:effectLst/>
+            </a:endParaRPr>
+          </a:p>
+          <a:p>
+            <a:pPr lvl="1" fontAlgn="base">
+              <a:lnSpc>
+                <a:spcPct val="90000"/>
+              </a:lnSpc>
+            </a:pPr>
+            <a:r>
+              <a:rPr lang="fr-FR" sz="2600" b="0" i="1" dirty="0">
+                <a:effectLst/>
+              </a:rPr>
+              <a:t>Panneaux solaires hybrides</a:t>
+            </a:r>
+          </a:p>
+          <a:p>
+            <a:pPr rtl="0">
+              <a:lnSpc>
+                <a:spcPct val="90000"/>
+              </a:lnSpc>
+            </a:pPr>
+            <a:endParaRPr lang="fr-FR" dirty="0"/>
+          </a:p>
+        </p:txBody>
+      </p:sp>
+      <p:pic>
+        <p:nvPicPr>
+          <p:cNvPr id="7" name="Image 6" descr="Une image contenant ciel, extérieur, terrain, objet d’extérieur&#10;&#10;Description générée automatiquement">
+            <a:extLst>
+              <a:ext uri="{FF2B5EF4-FFF2-40B4-BE49-F238E27FC236}">
+                <a16:creationId xmlns:a16="http://schemas.microsoft.com/office/drawing/2014/main" id="{29ACEBD8-7B6B-C745-ACAC-40C4429826A6}"/>
+              </a:ext>
+            </a:extLst>
+          </p:cNvPr>
+          <p:cNvPicPr>
+            <a:picLocks noChangeAspect="1"/>
+          </p:cNvPicPr>
+          <p:nvPr/>
+        </p:nvPicPr>
+        <p:blipFill rotWithShape="1">
+          <a:blip r:embed="rId3">
+            <a:extLst>
+              <a:ext uri="{28A0092B-C50C-407E-A947-70E740481C1C}">
+                <a14:useLocalDpi xmlns:a14="http://schemas.microsoft.com/office/drawing/2010/main" val="0"/>
+              </a:ext>
+            </a:extLst>
+          </a:blip>
+          <a:srcRect l="6419" r="25281" b="-2"/>
+          <a:stretch/>
+        </p:blipFill>
+        <p:spPr>
+          <a:xfrm>
+            <a:off x="6197600" y="2088901"/>
+            <a:ext cx="5384800" cy="4434840"/>
+          </a:xfrm>
+          <a:prstGeom prst="rect">
+            <a:avLst/>
+          </a:prstGeom>
+          <a:noFill/>
+          <a:effectLst>
+            <a:softEdge rad="228600"/>
+          </a:effectLst>
+        </p:spPr>
+      </p:pic>
     </p:spTree>
     <p:extLst>
       <p:ext uri="{BB962C8B-B14F-4D97-AF65-F5344CB8AC3E}">
@@ -6611,13 +7659,13 @@
   <p:clrMapOvr>
     <a:masterClrMapping/>
   </p:clrMapOvr>
-  <mc:AlternateContent xmlns:mc="http://schemas.openxmlformats.org/markup-compatibility/2006">
-    <mc:Choice xmlns:p14="http://schemas.microsoft.com/office/powerpoint/2010/main" Requires="p14">
+  <mc:AlternateContent xmlns:mc="http://schemas.openxmlformats.org/markup-compatibility/2006" xmlns:p14="http://schemas.microsoft.com/office/powerpoint/2010/main">
+    <mc:Choice Requires="p14">
       <p:transition spd="med" p14:dur="700">
         <p:fade/>
       </p:transition>
     </mc:Choice>
-    <mc:Fallback>
+    <mc:Fallback xmlns="">
       <p:transition spd="med">
         <p:fade/>
       </p:transition>
@@ -6653,9 +7701,16 @@
             <p:ph type="title"/>
           </p:nvPr>
         </p:nvSpPr>
-        <p:spPr/>
-        <p:txBody>
-          <a:bodyPr rtlCol="0"/>
+        <p:spPr>
+          <a:xfrm>
+            <a:off x="609600" y="704088"/>
+            <a:ext cx="10972800" cy="1143000"/>
+          </a:xfrm>
+        </p:spPr>
+        <p:txBody>
+          <a:bodyPr rtlCol="0" anchor="b">
+            <a:normAutofit/>
+          </a:bodyPr>
           <a:lstStyle/>
           <a:p>
             <a:pPr rtl="0"/>
@@ -6673,26 +7728,166 @@
             <a:spLocks noGrp="1"/>
           </p:cNvSpPr>
           <p:nvPr>
-            <p:ph idx="1"/>
-          </p:nvPr>
-        </p:nvSpPr>
-        <p:spPr/>
-        <p:txBody>
-          <a:bodyPr rtlCol="0"/>
-          <a:lstStyle/>
-          <a:p>
-            <a:pPr rtl="0"/>
-            <a:r>
-              <a:rPr lang="fr-FR" dirty="0"/>
-              <a:t>Éoliennes</a:t>
-            </a:r>
-          </a:p>
-        </p:txBody>
-      </p:sp>
+            <p:ph sz="half" idx="1"/>
+          </p:nvPr>
+        </p:nvSpPr>
+        <p:spPr>
+          <a:xfrm>
+            <a:off x="609600" y="2088899"/>
+            <a:ext cx="5384800" cy="4434840"/>
+          </a:xfrm>
+        </p:spPr>
+        <p:txBody>
+          <a:bodyPr rtlCol="0">
+            <a:noAutofit/>
+          </a:bodyPr>
+          <a:lstStyle/>
+          <a:p>
+            <a:pPr rtl="0">
+              <a:lnSpc>
+                <a:spcPct val="90000"/>
+              </a:lnSpc>
+            </a:pPr>
+            <a:r>
+              <a:rPr lang="fr-FR" b="1" dirty="0"/>
+              <a:t>Cellules photovoltaïques</a:t>
+            </a:r>
+          </a:p>
+          <a:p>
+            <a:pPr rtl="0">
+              <a:lnSpc>
+                <a:spcPct val="90000"/>
+              </a:lnSpc>
+            </a:pPr>
+            <a:endParaRPr lang="fr-FR" dirty="0"/>
+          </a:p>
+          <a:p>
+            <a:pPr lvl="1" fontAlgn="base">
+              <a:lnSpc>
+                <a:spcPct val="90000"/>
+              </a:lnSpc>
+            </a:pPr>
+            <a:r>
+              <a:rPr lang="fr-FR" sz="2600" b="0" i="1" u="sng" dirty="0">
+                <a:effectLst/>
+              </a:rPr>
+              <a:t>Cellules en silicium polycristallin</a:t>
+            </a:r>
+          </a:p>
+          <a:p>
+            <a:pPr lvl="1" fontAlgn="base">
+              <a:lnSpc>
+                <a:spcPct val="50000"/>
+              </a:lnSpc>
+            </a:pPr>
+            <a:endParaRPr lang="fr-FR" sz="2600" b="0" i="1" u="sng" dirty="0">
+              <a:effectLst/>
+            </a:endParaRPr>
+          </a:p>
+          <a:p>
+            <a:pPr lvl="1" fontAlgn="base">
+              <a:lnSpc>
+                <a:spcPct val="90000"/>
+              </a:lnSpc>
+            </a:pPr>
+            <a:r>
+              <a:rPr lang="fr-FR" sz="2600" b="0" i="1" u="sng" dirty="0">
+                <a:effectLst/>
+              </a:rPr>
+              <a:t>Cellules en silicium monocristallin</a:t>
+            </a:r>
+          </a:p>
+          <a:p>
+            <a:pPr lvl="1" fontAlgn="base">
+              <a:lnSpc>
+                <a:spcPct val="50000"/>
+              </a:lnSpc>
+            </a:pPr>
+            <a:endParaRPr lang="fr-FR" sz="2600" b="0" i="1" dirty="0">
+              <a:effectLst/>
+            </a:endParaRPr>
+          </a:p>
+          <a:p>
+            <a:pPr lvl="1" fontAlgn="base">
+              <a:lnSpc>
+                <a:spcPct val="90000"/>
+              </a:lnSpc>
+            </a:pPr>
+            <a:r>
+              <a:rPr lang="fr-FR" sz="2600" b="0" i="1" dirty="0">
+                <a:effectLst/>
+              </a:rPr>
+              <a:t>Cellules en silicium amorce en couche mince</a:t>
+            </a:r>
+          </a:p>
+          <a:p>
+            <a:pPr lvl="1" fontAlgn="base">
+              <a:lnSpc>
+                <a:spcPct val="50000"/>
+              </a:lnSpc>
+            </a:pPr>
+            <a:endParaRPr lang="fr-FR" sz="2600" b="0" i="1" dirty="0">
+              <a:effectLst/>
+            </a:endParaRPr>
+          </a:p>
+          <a:p>
+            <a:pPr lvl="1" fontAlgn="base">
+              <a:lnSpc>
+                <a:spcPct val="90000"/>
+              </a:lnSpc>
+            </a:pPr>
+            <a:r>
+              <a:rPr lang="fr-FR" sz="2600" b="0" i="1" dirty="0">
+                <a:effectLst/>
+              </a:rPr>
+              <a:t>Cellules en couche mince à base de cuivre (CIS ou CIGS))</a:t>
+            </a:r>
+          </a:p>
+        </p:txBody>
+      </p:sp>
+      <p:pic>
+        <p:nvPicPr>
+          <p:cNvPr id="5" name="Image 4">
+            <a:extLst>
+              <a:ext uri="{FF2B5EF4-FFF2-40B4-BE49-F238E27FC236}">
+                <a16:creationId xmlns:a16="http://schemas.microsoft.com/office/drawing/2014/main" id="{87ED8458-A03A-4163-AFBF-8BB449C77806}"/>
+              </a:ext>
+            </a:extLst>
+          </p:cNvPr>
+          <p:cNvPicPr>
+            <a:picLocks noChangeAspect="1"/>
+          </p:cNvPicPr>
+          <p:nvPr/>
+        </p:nvPicPr>
+        <p:blipFill rotWithShape="1">
+          <a:blip r:embed="rId3">
+            <a:extLst>
+              <a:ext uri="{28A0092B-C50C-407E-A947-70E740481C1C}">
+                <a14:useLocalDpi xmlns:a14="http://schemas.microsoft.com/office/drawing/2010/main" val="0"/>
+              </a:ext>
+            </a:extLst>
+          </a:blip>
+          <a:srcRect l="2889" r="6047" b="1"/>
+          <a:stretch/>
+        </p:blipFill>
+        <p:spPr>
+          <a:xfrm>
+            <a:off x="6157844" y="2088900"/>
+            <a:ext cx="5384800" cy="4434840"/>
+          </a:xfrm>
+          <a:prstGeom prst="rect">
+            <a:avLst/>
+          </a:prstGeom>
+          <a:noFill/>
+          <a:effectLst>
+            <a:softEdge rad="228600"/>
+          </a:effectLst>
+        </p:spPr>
+      </p:pic>
     </p:spTree>
     <p:extLst>
       <p:ext uri="{BB962C8B-B14F-4D97-AF65-F5344CB8AC3E}">
-        <p14:creationId xmlns:p14="http://schemas.microsoft.com/office/powerpoint/2010/main" val="2668546836"/>
+        <p14:creationId xmlns:p14="http://schemas.microsoft.com/office/powerpoint/2010/main" val="647993326"/>
       </p:ext>
     </p:extLst>
   </p:cSld>
@@ -6749,7 +7944,7 @@
             <a:pPr rtl="0"/>
             <a:r>
               <a:rPr lang="fr-FR" dirty="0"/>
-              <a:t>Notre solution</a:t>
+              <a:t>Résultats de recherche :</a:t>
             </a:r>
           </a:p>
         </p:txBody>
@@ -6769,17 +7964,18 @@
           <a:bodyPr rtlCol="0"/>
           <a:lstStyle/>
           <a:p>
-            <a:pPr marL="0" indent="0" rtl="0">
-              <a:buNone/>
-            </a:pPr>
-            <a:endParaRPr lang="fr-FR" dirty="0"/>
+            <a:pPr rtl="0"/>
+            <a:r>
+              <a:rPr lang="fr-FR" b="1" dirty="0"/>
+              <a:t>Éoliennes</a:t>
+            </a:r>
           </a:p>
         </p:txBody>
       </p:sp>
     </p:spTree>
     <p:extLst>
       <p:ext uri="{BB962C8B-B14F-4D97-AF65-F5344CB8AC3E}">
-        <p14:creationId xmlns:p14="http://schemas.microsoft.com/office/powerpoint/2010/main" val="3252008090"/>
+        <p14:creationId xmlns:p14="http://schemas.microsoft.com/office/powerpoint/2010/main" val="2668546836"/>
       </p:ext>
     </p:extLst>
   </p:cSld>
@@ -6836,7 +8032,7 @@
             <a:pPr rtl="0"/>
             <a:r>
               <a:rPr lang="fr-FR" dirty="0"/>
-              <a:t>État d’avancement du projet</a:t>
+              <a:t>Notre solution</a:t>
             </a:r>
           </a:p>
         </p:txBody>
@@ -6866,7 +8062,7 @@
     </p:spTree>
     <p:extLst>
       <p:ext uri="{BB962C8B-B14F-4D97-AF65-F5344CB8AC3E}">
-        <p14:creationId xmlns:p14="http://schemas.microsoft.com/office/powerpoint/2010/main" val="1419453836"/>
+        <p14:creationId xmlns:p14="http://schemas.microsoft.com/office/powerpoint/2010/main" val="3252008090"/>
       </p:ext>
     </p:extLst>
   </p:cSld>

</xml_diff>